<commit_message>
Fixed some mistakes regarding QQCBC
</commit_message>
<xml_diff>
--- a/BlockCipherDiagram.pptx
+++ b/BlockCipherDiagram.pptx
@@ -203,7 +203,7 @@
           <a:p>
             <a:fld id="{15D337FF-4FF5-44BA-B2B3-14ED87713994}" type="datetimeFigureOut">
               <a:rPr lang="zh-CN" altLang="en-US" smtClean="0"/>
-              <a:t>2020/4/5</a:t>
+              <a:t>2020/4/6</a:t>
             </a:fld>
             <a:endParaRPr lang="zh-CN" altLang="en-US"/>
           </a:p>
@@ -685,7 +685,7 @@
           <a:p>
             <a:fld id="{14AE536D-189D-4E36-92A9-4555D760F2DC}" type="datetimeFigureOut">
               <a:rPr lang="zh-CN" altLang="en-US" smtClean="0"/>
-              <a:t>2020/4/5</a:t>
+              <a:t>2020/4/6</a:t>
             </a:fld>
             <a:endParaRPr lang="zh-CN" altLang="en-US"/>
           </a:p>
@@ -855,7 +855,7 @@
           <a:p>
             <a:fld id="{14AE536D-189D-4E36-92A9-4555D760F2DC}" type="datetimeFigureOut">
               <a:rPr lang="zh-CN" altLang="en-US" smtClean="0"/>
-              <a:t>2020/4/5</a:t>
+              <a:t>2020/4/6</a:t>
             </a:fld>
             <a:endParaRPr lang="zh-CN" altLang="en-US"/>
           </a:p>
@@ -1035,7 +1035,7 @@
           <a:p>
             <a:fld id="{14AE536D-189D-4E36-92A9-4555D760F2DC}" type="datetimeFigureOut">
               <a:rPr lang="zh-CN" altLang="en-US" smtClean="0"/>
-              <a:t>2020/4/5</a:t>
+              <a:t>2020/4/6</a:t>
             </a:fld>
             <a:endParaRPr lang="zh-CN" altLang="en-US"/>
           </a:p>
@@ -1205,7 +1205,7 @@
           <a:p>
             <a:fld id="{14AE536D-189D-4E36-92A9-4555D760F2DC}" type="datetimeFigureOut">
               <a:rPr lang="zh-CN" altLang="en-US" smtClean="0"/>
-              <a:t>2020/4/5</a:t>
+              <a:t>2020/4/6</a:t>
             </a:fld>
             <a:endParaRPr lang="zh-CN" altLang="en-US"/>
           </a:p>
@@ -1451,7 +1451,7 @@
           <a:p>
             <a:fld id="{14AE536D-189D-4E36-92A9-4555D760F2DC}" type="datetimeFigureOut">
               <a:rPr lang="zh-CN" altLang="en-US" smtClean="0"/>
-              <a:t>2020/4/5</a:t>
+              <a:t>2020/4/6</a:t>
             </a:fld>
             <a:endParaRPr lang="zh-CN" altLang="en-US"/>
           </a:p>
@@ -1683,7 +1683,7 @@
           <a:p>
             <a:fld id="{14AE536D-189D-4E36-92A9-4555D760F2DC}" type="datetimeFigureOut">
               <a:rPr lang="zh-CN" altLang="en-US" smtClean="0"/>
-              <a:t>2020/4/5</a:t>
+              <a:t>2020/4/6</a:t>
             </a:fld>
             <a:endParaRPr lang="zh-CN" altLang="en-US"/>
           </a:p>
@@ -2050,7 +2050,7 @@
           <a:p>
             <a:fld id="{14AE536D-189D-4E36-92A9-4555D760F2DC}" type="datetimeFigureOut">
               <a:rPr lang="zh-CN" altLang="en-US" smtClean="0"/>
-              <a:t>2020/4/5</a:t>
+              <a:t>2020/4/6</a:t>
             </a:fld>
             <a:endParaRPr lang="zh-CN" altLang="en-US"/>
           </a:p>
@@ -2168,7 +2168,7 @@
           <a:p>
             <a:fld id="{14AE536D-189D-4E36-92A9-4555D760F2DC}" type="datetimeFigureOut">
               <a:rPr lang="zh-CN" altLang="en-US" smtClean="0"/>
-              <a:t>2020/4/5</a:t>
+              <a:t>2020/4/6</a:t>
             </a:fld>
             <a:endParaRPr lang="zh-CN" altLang="en-US"/>
           </a:p>
@@ -2263,7 +2263,7 @@
           <a:p>
             <a:fld id="{14AE536D-189D-4E36-92A9-4555D760F2DC}" type="datetimeFigureOut">
               <a:rPr lang="zh-CN" altLang="en-US" smtClean="0"/>
-              <a:t>2020/4/5</a:t>
+              <a:t>2020/4/6</a:t>
             </a:fld>
             <a:endParaRPr lang="zh-CN" altLang="en-US"/>
           </a:p>
@@ -2540,7 +2540,7 @@
           <a:p>
             <a:fld id="{14AE536D-189D-4E36-92A9-4555D760F2DC}" type="datetimeFigureOut">
               <a:rPr lang="zh-CN" altLang="en-US" smtClean="0"/>
-              <a:t>2020/4/5</a:t>
+              <a:t>2020/4/6</a:t>
             </a:fld>
             <a:endParaRPr lang="zh-CN" altLang="en-US"/>
           </a:p>
@@ -2797,7 +2797,7 @@
           <a:p>
             <a:fld id="{14AE536D-189D-4E36-92A9-4555D760F2DC}" type="datetimeFigureOut">
               <a:rPr lang="zh-CN" altLang="en-US" smtClean="0"/>
-              <a:t>2020/4/5</a:t>
+              <a:t>2020/4/6</a:t>
             </a:fld>
             <a:endParaRPr lang="zh-CN" altLang="en-US"/>
           </a:p>
@@ -3010,7 +3010,7 @@
           <a:p>
             <a:fld id="{14AE536D-189D-4E36-92A9-4555D760F2DC}" type="datetimeFigureOut">
               <a:rPr lang="zh-CN" altLang="en-US" smtClean="0"/>
-              <a:t>2020/4/5</a:t>
+              <a:t>2020/4/6</a:t>
             </a:fld>
             <a:endParaRPr lang="zh-CN" altLang="en-US"/>
           </a:p>
@@ -3661,7 +3661,7 @@
         </p:nvGrpSpPr>
         <p:grpSpPr>
           <a:xfrm>
-            <a:off x="7892639" y="3922084"/>
+            <a:off x="7952655" y="4240587"/>
             <a:ext cx="385432" cy="385432"/>
             <a:chOff x="8466449" y="5881960"/>
             <a:chExt cx="385432" cy="385432"/>
@@ -3897,7 +3897,7 @@
             <p:nvPr/>
           </p:nvPicPr>
           <p:blipFill>
-            <a:blip r:embed="rId2"/>
+            <a:blip r:embed="rId3"/>
             <a:stretch>
               <a:fillRect/>
             </a:stretch>
@@ -3992,7 +3992,7 @@
             <p:nvPr/>
           </p:nvPicPr>
           <p:blipFill>
-            <a:blip r:embed="rId2"/>
+            <a:blip r:embed="rId3"/>
             <a:stretch>
               <a:fillRect/>
             </a:stretch>
@@ -4022,7 +4022,7 @@
         </p:nvGrpSpPr>
         <p:grpSpPr>
           <a:xfrm>
-            <a:off x="3667541" y="2390398"/>
+            <a:off x="3662480" y="2390398"/>
             <a:ext cx="2743438" cy="643676"/>
             <a:chOff x="906234" y="758786"/>
             <a:chExt cx="2743438" cy="643676"/>
@@ -4087,7 +4087,7 @@
             <p:nvPr/>
           </p:nvPicPr>
           <p:blipFill>
-            <a:blip r:embed="rId3"/>
+            <a:blip r:embed="rId4"/>
             <a:stretch>
               <a:fillRect/>
             </a:stretch>
@@ -4177,16 +4177,475 @@
   </p:clrMapOvr>
   <mc:AlternateContent xmlns:mc="http://schemas.openxmlformats.org/markup-compatibility/2006" xmlns:p159="http://schemas.microsoft.com/office/powerpoint/2015/09/main">
     <mc:Choice Requires="p159">
-      <p:transition>
-        <p159:morph option="byObject"/>
+      <p:transition xmlns:p14="http://schemas.microsoft.com/office/powerpoint/2010/main" spd="slow" p14:dur="2000">
+        <p159:morph option="byChar"/>
       </p:transition>
     </mc:Choice>
     <mc:Fallback xmlns="">
-      <p:transition>
+      <p:transition spd="slow">
         <p:fade/>
       </p:transition>
     </mc:Fallback>
   </mc:AlternateContent>
+  <p:timing>
+    <p:tnLst>
+      <p:par>
+        <p:cTn id="1" dur="indefinite" restart="never" nodeType="tmRoot">
+          <p:childTnLst>
+            <p:seq concurrent="1" nextAc="seek">
+              <p:cTn id="2" dur="indefinite" nodeType="mainSeq">
+                <p:childTnLst>
+                  <p:par>
+                    <p:cTn id="3" fill="hold">
+                      <p:stCondLst>
+                        <p:cond delay="indefinite"/>
+                        <p:cond evt="onBegin" delay="0">
+                          <p:tn val="2"/>
+                        </p:cond>
+                      </p:stCondLst>
+                      <p:childTnLst>
+                        <p:par>
+                          <p:cTn id="4" fill="hold">
+                            <p:stCondLst>
+                              <p:cond delay="0"/>
+                            </p:stCondLst>
+                            <p:childTnLst>
+                              <p:par>
+                                <p:cTn id="5" presetID="1" presetClass="entr" presetSubtype="0" fill="hold" grpId="0" nodeType="withEffect">
+                                  <p:stCondLst>
+                                    <p:cond delay="500"/>
+                                  </p:stCondLst>
+                                  <p:childTnLst>
+                                    <p:set>
+                                      <p:cBhvr>
+                                        <p:cTn id="6" dur="1" fill="hold">
+                                          <p:stCondLst>
+                                            <p:cond delay="0"/>
+                                          </p:stCondLst>
+                                        </p:cTn>
+                                        <p:tgtEl>
+                                          <p:spTgt spid="14"/>
+                                        </p:tgtEl>
+                                        <p:attrNameLst>
+                                          <p:attrName>style.visibility</p:attrName>
+                                        </p:attrNameLst>
+                                      </p:cBhvr>
+                                      <p:to>
+                                        <p:strVal val="visible"/>
+                                      </p:to>
+                                    </p:set>
+                                  </p:childTnLst>
+                                  <p:subTnLst>
+                                    <p:audio>
+                                      <p:cMediaNode>
+                                        <p:cTn display="0" masterRel="sameClick">
+                                          <p:stCondLst>
+                                            <p:cond evt="begin" delay="0">
+                                              <p:tn val="5"/>
+                                            </p:cond>
+                                          </p:stCondLst>
+                                          <p:endCondLst>
+                                            <p:cond evt="onStopAudio" delay="0">
+                                              <p:tgtEl>
+                                                <p:sldTgt/>
+                                              </p:tgtEl>
+                                            </p:cond>
+                                          </p:endCondLst>
+                                        </p:cTn>
+                                        <p:tgtEl>
+                                          <p:sndTgt r:embed="rId2" name="grovekick.wav"/>
+                                        </p:tgtEl>
+                                      </p:cMediaNode>
+                                    </p:audio>
+                                  </p:subTnLst>
+                                </p:cTn>
+                              </p:par>
+                            </p:childTnLst>
+                          </p:cTn>
+                        </p:par>
+                        <p:par>
+                          <p:cTn id="7" fill="hold">
+                            <p:stCondLst>
+                              <p:cond delay="500"/>
+                            </p:stCondLst>
+                            <p:childTnLst>
+                              <p:par>
+                                <p:cTn id="8" presetID="1" presetClass="entr" presetSubtype="0" fill="hold" nodeType="afterEffect">
+                                  <p:stCondLst>
+                                    <p:cond delay="500"/>
+                                  </p:stCondLst>
+                                  <p:childTnLst>
+                                    <p:set>
+                                      <p:cBhvr>
+                                        <p:cTn id="9" dur="1" fill="hold">
+                                          <p:stCondLst>
+                                            <p:cond delay="0"/>
+                                          </p:stCondLst>
+                                        </p:cTn>
+                                        <p:tgtEl>
+                                          <p:spTgt spid="40"/>
+                                        </p:tgtEl>
+                                        <p:attrNameLst>
+                                          <p:attrName>style.visibility</p:attrName>
+                                        </p:attrNameLst>
+                                      </p:cBhvr>
+                                      <p:to>
+                                        <p:strVal val="visible"/>
+                                      </p:to>
+                                    </p:set>
+                                  </p:childTnLst>
+                                  <p:subTnLst>
+                                    <p:audio>
+                                      <p:cMediaNode>
+                                        <p:cTn display="0" masterRel="sameClick">
+                                          <p:stCondLst>
+                                            <p:cond evt="begin" delay="0">
+                                              <p:tn val="8"/>
+                                            </p:cond>
+                                          </p:stCondLst>
+                                          <p:endCondLst>
+                                            <p:cond evt="onStopAudio" delay="0">
+                                              <p:tgtEl>
+                                                <p:sldTgt/>
+                                              </p:tgtEl>
+                                            </p:cond>
+                                          </p:endCondLst>
+                                        </p:cTn>
+                                        <p:tgtEl>
+                                          <p:sndTgt r:embed="rId2" name="grovekick.wav"/>
+                                        </p:tgtEl>
+                                      </p:cMediaNode>
+                                    </p:audio>
+                                  </p:subTnLst>
+                                </p:cTn>
+                              </p:par>
+                            </p:childTnLst>
+                          </p:cTn>
+                        </p:par>
+                        <p:par>
+                          <p:cTn id="10" fill="hold">
+                            <p:stCondLst>
+                              <p:cond delay="1000"/>
+                            </p:stCondLst>
+                            <p:childTnLst>
+                              <p:par>
+                                <p:cTn id="11" presetID="1" presetClass="entr" presetSubtype="0" fill="hold" grpId="0" nodeType="afterEffect">
+                                  <p:stCondLst>
+                                    <p:cond delay="500"/>
+                                  </p:stCondLst>
+                                  <p:childTnLst>
+                                    <p:set>
+                                      <p:cBhvr>
+                                        <p:cTn id="12" dur="1" fill="hold">
+                                          <p:stCondLst>
+                                            <p:cond delay="0"/>
+                                          </p:stCondLst>
+                                        </p:cTn>
+                                        <p:tgtEl>
+                                          <p:spTgt spid="15"/>
+                                        </p:tgtEl>
+                                        <p:attrNameLst>
+                                          <p:attrName>style.visibility</p:attrName>
+                                        </p:attrNameLst>
+                                      </p:cBhvr>
+                                      <p:to>
+                                        <p:strVal val="visible"/>
+                                      </p:to>
+                                    </p:set>
+                                  </p:childTnLst>
+                                  <p:subTnLst>
+                                    <p:audio>
+                                      <p:cMediaNode>
+                                        <p:cTn display="0" masterRel="sameClick">
+                                          <p:stCondLst>
+                                            <p:cond evt="begin" delay="0">
+                                              <p:tn val="11"/>
+                                            </p:cond>
+                                          </p:stCondLst>
+                                          <p:endCondLst>
+                                            <p:cond evt="onStopAudio" delay="0">
+                                              <p:tgtEl>
+                                                <p:sldTgt/>
+                                              </p:tgtEl>
+                                            </p:cond>
+                                          </p:endCondLst>
+                                        </p:cTn>
+                                        <p:tgtEl>
+                                          <p:sndTgt r:embed="rId2" name="grovekick.wav"/>
+                                        </p:tgtEl>
+                                      </p:cMediaNode>
+                                    </p:audio>
+                                  </p:subTnLst>
+                                </p:cTn>
+                              </p:par>
+                            </p:childTnLst>
+                          </p:cTn>
+                        </p:par>
+                        <p:par>
+                          <p:cTn id="13" fill="hold">
+                            <p:stCondLst>
+                              <p:cond delay="1500"/>
+                            </p:stCondLst>
+                            <p:childTnLst>
+                              <p:par>
+                                <p:cTn id="14" presetID="1" presetClass="entr" presetSubtype="0" fill="hold" nodeType="afterEffect">
+                                  <p:stCondLst>
+                                    <p:cond delay="500"/>
+                                  </p:stCondLst>
+                                  <p:childTnLst>
+                                    <p:set>
+                                      <p:cBhvr>
+                                        <p:cTn id="15" dur="1" fill="hold">
+                                          <p:stCondLst>
+                                            <p:cond delay="0"/>
+                                          </p:stCondLst>
+                                        </p:cTn>
+                                        <p:tgtEl>
+                                          <p:spTgt spid="20"/>
+                                        </p:tgtEl>
+                                        <p:attrNameLst>
+                                          <p:attrName>style.visibility</p:attrName>
+                                        </p:attrNameLst>
+                                      </p:cBhvr>
+                                      <p:to>
+                                        <p:strVal val="visible"/>
+                                      </p:to>
+                                    </p:set>
+                                  </p:childTnLst>
+                                  <p:subTnLst>
+                                    <p:audio>
+                                      <p:cMediaNode>
+                                        <p:cTn display="0" masterRel="sameClick">
+                                          <p:stCondLst>
+                                            <p:cond evt="begin" delay="0">
+                                              <p:tn val="14"/>
+                                            </p:cond>
+                                          </p:stCondLst>
+                                          <p:endCondLst>
+                                            <p:cond evt="onStopAudio" delay="0">
+                                              <p:tgtEl>
+                                                <p:sldTgt/>
+                                              </p:tgtEl>
+                                            </p:cond>
+                                          </p:endCondLst>
+                                        </p:cTn>
+                                        <p:tgtEl>
+                                          <p:sndTgt r:embed="rId2" name="grovekick.wav"/>
+                                        </p:tgtEl>
+                                      </p:cMediaNode>
+                                    </p:audio>
+                                  </p:subTnLst>
+                                </p:cTn>
+                              </p:par>
+                            </p:childTnLst>
+                          </p:cTn>
+                        </p:par>
+                        <p:par>
+                          <p:cTn id="16" fill="hold">
+                            <p:stCondLst>
+                              <p:cond delay="2000"/>
+                            </p:stCondLst>
+                            <p:childTnLst>
+                              <p:par>
+                                <p:cTn id="17" presetID="1" presetClass="entr" presetSubtype="0" fill="hold" nodeType="afterEffect">
+                                  <p:stCondLst>
+                                    <p:cond delay="500"/>
+                                  </p:stCondLst>
+                                  <p:childTnLst>
+                                    <p:set>
+                                      <p:cBhvr>
+                                        <p:cTn id="18" dur="1" fill="hold">
+                                          <p:stCondLst>
+                                            <p:cond delay="0"/>
+                                          </p:stCondLst>
+                                        </p:cTn>
+                                        <p:tgtEl>
+                                          <p:spTgt spid="42"/>
+                                        </p:tgtEl>
+                                        <p:attrNameLst>
+                                          <p:attrName>style.visibility</p:attrName>
+                                        </p:attrNameLst>
+                                      </p:cBhvr>
+                                      <p:to>
+                                        <p:strVal val="visible"/>
+                                      </p:to>
+                                    </p:set>
+                                  </p:childTnLst>
+                                  <p:subTnLst>
+                                    <p:audio>
+                                      <p:cMediaNode>
+                                        <p:cTn display="0" masterRel="sameClick">
+                                          <p:stCondLst>
+                                            <p:cond evt="begin" delay="0">
+                                              <p:tn val="17"/>
+                                            </p:cond>
+                                          </p:stCondLst>
+                                          <p:endCondLst>
+                                            <p:cond evt="onStopAudio" delay="0">
+                                              <p:tgtEl>
+                                                <p:sldTgt/>
+                                              </p:tgtEl>
+                                            </p:cond>
+                                          </p:endCondLst>
+                                        </p:cTn>
+                                        <p:tgtEl>
+                                          <p:sndTgt r:embed="rId2" name="grovekick.wav"/>
+                                        </p:tgtEl>
+                                      </p:cMediaNode>
+                                    </p:audio>
+                                  </p:subTnLst>
+                                </p:cTn>
+                              </p:par>
+                            </p:childTnLst>
+                          </p:cTn>
+                        </p:par>
+                        <p:par>
+                          <p:cTn id="19" fill="hold">
+                            <p:stCondLst>
+                              <p:cond delay="2500"/>
+                            </p:stCondLst>
+                            <p:childTnLst>
+                              <p:par>
+                                <p:cTn id="20" presetID="1" presetClass="entr" presetSubtype="0" fill="hold" nodeType="afterEffect">
+                                  <p:stCondLst>
+                                    <p:cond delay="500"/>
+                                  </p:stCondLst>
+                                  <p:childTnLst>
+                                    <p:set>
+                                      <p:cBhvr>
+                                        <p:cTn id="21" dur="1" fill="hold">
+                                          <p:stCondLst>
+                                            <p:cond delay="0"/>
+                                          </p:stCondLst>
+                                        </p:cTn>
+                                        <p:tgtEl>
+                                          <p:spTgt spid="45"/>
+                                        </p:tgtEl>
+                                        <p:attrNameLst>
+                                          <p:attrName>style.visibility</p:attrName>
+                                        </p:attrNameLst>
+                                      </p:cBhvr>
+                                      <p:to>
+                                        <p:strVal val="visible"/>
+                                      </p:to>
+                                    </p:set>
+                                  </p:childTnLst>
+                                  <p:subTnLst>
+                                    <p:audio>
+                                      <p:cMediaNode>
+                                        <p:cTn display="0" masterRel="sameClick">
+                                          <p:stCondLst>
+                                            <p:cond evt="begin" delay="0">
+                                              <p:tn val="20"/>
+                                            </p:cond>
+                                          </p:stCondLst>
+                                          <p:endCondLst>
+                                            <p:cond evt="onStopAudio" delay="0">
+                                              <p:tgtEl>
+                                                <p:sldTgt/>
+                                              </p:tgtEl>
+                                            </p:cond>
+                                          </p:endCondLst>
+                                        </p:cTn>
+                                        <p:tgtEl>
+                                          <p:sndTgt r:embed="rId2" name="grovekick.wav"/>
+                                        </p:tgtEl>
+                                      </p:cMediaNode>
+                                    </p:audio>
+                                  </p:subTnLst>
+                                </p:cTn>
+                              </p:par>
+                            </p:childTnLst>
+                          </p:cTn>
+                        </p:par>
+                        <p:par>
+                          <p:cTn id="22" fill="hold">
+                            <p:stCondLst>
+                              <p:cond delay="3000"/>
+                            </p:stCondLst>
+                            <p:childTnLst>
+                              <p:par>
+                                <p:cTn id="23" presetID="1" presetClass="entr" presetSubtype="0" fill="hold" nodeType="afterEffect">
+                                  <p:stCondLst>
+                                    <p:cond delay="500"/>
+                                  </p:stCondLst>
+                                  <p:childTnLst>
+                                    <p:set>
+                                      <p:cBhvr>
+                                        <p:cTn id="24" dur="1" fill="hold">
+                                          <p:stCondLst>
+                                            <p:cond delay="0"/>
+                                          </p:stCondLst>
+                                        </p:cTn>
+                                        <p:tgtEl>
+                                          <p:spTgt spid="51"/>
+                                        </p:tgtEl>
+                                        <p:attrNameLst>
+                                          <p:attrName>style.visibility</p:attrName>
+                                        </p:attrNameLst>
+                                      </p:cBhvr>
+                                      <p:to>
+                                        <p:strVal val="visible"/>
+                                      </p:to>
+                                    </p:set>
+                                  </p:childTnLst>
+                                  <p:subTnLst>
+                                    <p:audio>
+                                      <p:cMediaNode>
+                                        <p:cTn display="0" masterRel="sameClick">
+                                          <p:stCondLst>
+                                            <p:cond evt="begin" delay="0">
+                                              <p:tn val="23"/>
+                                            </p:cond>
+                                          </p:stCondLst>
+                                          <p:endCondLst>
+                                            <p:cond evt="onStopAudio" delay="0">
+                                              <p:tgtEl>
+                                                <p:sldTgt/>
+                                              </p:tgtEl>
+                                            </p:cond>
+                                          </p:endCondLst>
+                                        </p:cTn>
+                                        <p:tgtEl>
+                                          <p:sndTgt r:embed="rId2" name="grovekick.wav"/>
+                                        </p:tgtEl>
+                                      </p:cMediaNode>
+                                    </p:audio>
+                                  </p:subTnLst>
+                                </p:cTn>
+                              </p:par>
+                            </p:childTnLst>
+                          </p:cTn>
+                        </p:par>
+                      </p:childTnLst>
+                    </p:cTn>
+                  </p:par>
+                </p:childTnLst>
+              </p:cTn>
+              <p:prevCondLst>
+                <p:cond evt="onPrev" delay="0">
+                  <p:tgtEl>
+                    <p:sldTgt/>
+                  </p:tgtEl>
+                </p:cond>
+              </p:prevCondLst>
+              <p:nextCondLst>
+                <p:cond evt="onNext" delay="0">
+                  <p:tgtEl>
+                    <p:sldTgt/>
+                  </p:tgtEl>
+                </p:cond>
+              </p:nextCondLst>
+            </p:seq>
+          </p:childTnLst>
+        </p:cTn>
+      </p:par>
+    </p:tnLst>
+    <p:bldLst>
+      <p:bldP spid="14" grpId="0" animBg="1"/>
+      <p:bldP spid="15" grpId="0" animBg="1"/>
+    </p:bldLst>
+  </p:timing>
 </p:sld>
 </file>
 
@@ -5587,8 +6046,8 @@
           </a:fontRef>
         </p:style>
       </p:cxnSp>
-      <mc:AlternateContent xmlns:mc="http://schemas.openxmlformats.org/markup-compatibility/2006">
-        <mc:Choice xmlns:a14="http://schemas.microsoft.com/office/drawing/2010/main" Requires="a14">
+      <mc:AlternateContent xmlns:mc="http://schemas.openxmlformats.org/markup-compatibility/2006" xmlns:a14="http://schemas.microsoft.com/office/drawing/2010/main">
+        <mc:Choice Requires="a14">
           <p:sp>
             <p:nvSpPr>
               <p:cNvPr id="9" name="矩形 8">
@@ -5616,6 +6075,7 @@
               </a:bodyPr>
               <a:lstStyle/>
               <a:p>
+                <a:pPr/>
                 <a14:m>
                   <m:oMathPara xmlns:m="http://schemas.openxmlformats.org/officeDocument/2006/math">
                     <m:oMathParaPr>
@@ -5693,6 +6153,7 @@
                 <a:endParaRPr lang="en-US" altLang="zh-CN"/>
               </a:p>
               <a:p>
+                <a:pPr/>
                 <a14:m>
                   <m:oMathPara xmlns:m="http://schemas.openxmlformats.org/officeDocument/2006/math">
                     <m:oMathParaPr>
@@ -5733,7 +6194,7 @@
             </p:txBody>
           </p:sp>
         </mc:Choice>
-        <mc:Fallback>
+        <mc:Fallback xmlns="">
           <p:sp>
             <p:nvSpPr>
               <p:cNvPr id="9" name="矩形 8">
@@ -5790,12 +6251,12 @@
   </p:clrMapOvr>
   <mc:AlternateContent xmlns:mc="http://schemas.openxmlformats.org/markup-compatibility/2006" xmlns:p159="http://schemas.microsoft.com/office/powerpoint/2015/09/main">
     <mc:Choice Requires="p159">
-      <p:transition>
+      <p:transition xmlns:p14="http://schemas.microsoft.com/office/powerpoint/2010/main" spd="slow" p14:dur="2000">
         <p159:morph option="byObject"/>
       </p:transition>
     </mc:Choice>
     <mc:Fallback xmlns="">
-      <p:transition>
+      <p:transition spd="slow">
         <p:fade/>
       </p:transition>
     </mc:Fallback>
@@ -7199,8 +7660,8 @@
           </p:style>
         </p:cxnSp>
       </p:grpSp>
-      <mc:AlternateContent xmlns:mc="http://schemas.openxmlformats.org/markup-compatibility/2006">
-        <mc:Choice xmlns:a14="http://schemas.microsoft.com/office/drawing/2010/main" Requires="a14">
+      <mc:AlternateContent xmlns:mc="http://schemas.openxmlformats.org/markup-compatibility/2006" xmlns:a14="http://schemas.microsoft.com/office/drawing/2010/main">
+        <mc:Choice Requires="a14">
           <p:sp>
             <p:nvSpPr>
               <p:cNvPr id="39" name="矩形 38">
@@ -7228,6 +7689,7 @@
               </a:bodyPr>
               <a:lstStyle/>
               <a:p>
+                <a:pPr/>
                 <a14:m>
                   <m:oMathPara xmlns:m="http://schemas.openxmlformats.org/officeDocument/2006/math">
                     <m:oMathParaPr>
@@ -7304,6 +7766,7 @@
                 <a:endParaRPr lang="en-US" altLang="zh-CN" baseline="-25000"/>
               </a:p>
               <a:p>
+                <a:pPr/>
                 <a14:m>
                   <m:oMathPara xmlns:m="http://schemas.openxmlformats.org/officeDocument/2006/math">
                     <m:oMathParaPr>
@@ -7344,7 +7807,7 @@
             </p:txBody>
           </p:sp>
         </mc:Choice>
-        <mc:Fallback>
+        <mc:Fallback xmlns="">
           <p:sp>
             <p:nvSpPr>
               <p:cNvPr id="39" name="矩形 38">
@@ -7401,12 +7864,12 @@
   </p:clrMapOvr>
   <mc:AlternateContent xmlns:mc="http://schemas.openxmlformats.org/markup-compatibility/2006" xmlns:p159="http://schemas.microsoft.com/office/powerpoint/2015/09/main">
     <mc:Choice Requires="p159">
-      <p:transition>
-        <p159:morph option="byObject"/>
+      <p:transition xmlns:p14="http://schemas.microsoft.com/office/powerpoint/2010/main" spd="slow" p14:dur="2000">
+        <p159:morph option="byChar"/>
       </p:transition>
     </mc:Choice>
     <mc:Fallback xmlns="">
-      <p:transition>
+      <p:transition spd="slow">
         <p:fade/>
       </p:transition>
     </mc:Fallback>
@@ -9735,8 +10198,8 @@
           </a:fontRef>
         </p:style>
       </p:cxnSp>
-      <mc:AlternateContent xmlns:mc="http://schemas.openxmlformats.org/markup-compatibility/2006">
-        <mc:Choice xmlns:a14="http://schemas.microsoft.com/office/drawing/2010/main" Requires="a14">
+      <mc:AlternateContent xmlns:mc="http://schemas.openxmlformats.org/markup-compatibility/2006" xmlns:a14="http://schemas.microsoft.com/office/drawing/2010/main">
+        <mc:Choice Requires="a14">
           <p:sp>
             <p:nvSpPr>
               <p:cNvPr id="4" name="文本框 3">
@@ -9765,6 +10228,7 @@
               </a:bodyPr>
               <a:lstStyle/>
               <a:p>
+                <a:pPr/>
                 <a14:m>
                   <m:oMathPara xmlns:m="http://schemas.openxmlformats.org/officeDocument/2006/math">
                     <m:oMathParaPr>
@@ -9849,6 +10313,7 @@
                 </a:endParaRPr>
               </a:p>
               <a:p>
+                <a:pPr/>
                 <a14:m>
                   <m:oMathPara xmlns:m="http://schemas.openxmlformats.org/officeDocument/2006/math">
                     <m:oMathParaPr>
@@ -9924,13 +10389,7 @@
                         <a:rPr lang="en-US" altLang="zh-CN" i="1">
                           <a:latin typeface="Cambria Math" panose="02040503050406030204" pitchFamily="18" charset="0"/>
                         </a:rPr>
-                        <m:t>𝐶𝑖𝑝h𝑒𝑟𝑇𝑒</m:t>
-                      </m:r>
-                      <m:r>
-                        <a:rPr lang="en-US" altLang="zh-CN" i="1">
-                          <a:latin typeface="Cambria Math" panose="02040503050406030204" pitchFamily="18" charset="0"/>
-                        </a:rPr>
-                        <m:t>𝑥𝑡</m:t>
+                        <m:t>𝐶𝑖𝑝h𝑒𝑟𝑇𝑒𝑥𝑡</m:t>
                       </m:r>
                       <m:r>
                         <a:rPr lang="en-US" altLang="zh-CN" i="1" baseline="-25000">
@@ -9958,7 +10417,7 @@
             </p:txBody>
           </p:sp>
         </mc:Choice>
-        <mc:Fallback>
+        <mc:Fallback xmlns="">
           <p:sp>
             <p:nvSpPr>
               <p:cNvPr id="4" name="文本框 3">
@@ -10015,12 +10474,12 @@
   </p:clrMapOvr>
   <mc:AlternateContent xmlns:mc="http://schemas.openxmlformats.org/markup-compatibility/2006" xmlns:p159="http://schemas.microsoft.com/office/powerpoint/2015/09/main">
     <mc:Choice Requires="p159">
-      <p:transition>
+      <p:transition xmlns:p14="http://schemas.microsoft.com/office/powerpoint/2010/main" spd="slow" p14:dur="2000">
         <p159:morph option="byObject"/>
       </p:transition>
     </mc:Choice>
     <mc:Fallback xmlns="">
-      <p:transition>
+      <p:transition spd="slow">
         <p:fade/>
       </p:transition>
     </mc:Fallback>
@@ -12305,8 +12764,8 @@
           </a:fontRef>
         </p:style>
       </p:cxnSp>
-      <mc:AlternateContent xmlns:mc="http://schemas.openxmlformats.org/markup-compatibility/2006">
-        <mc:Choice xmlns:a14="http://schemas.microsoft.com/office/drawing/2010/main" Requires="a14">
+      <mc:AlternateContent xmlns:mc="http://schemas.openxmlformats.org/markup-compatibility/2006" xmlns:a14="http://schemas.microsoft.com/office/drawing/2010/main">
+        <mc:Choice Requires="a14">
           <p:sp>
             <p:nvSpPr>
               <p:cNvPr id="60" name="文本框 59">
@@ -12493,19 +12952,7 @@
                       <a:rPr lang="en-US" altLang="zh-CN" i="1">
                         <a:latin typeface="Cambria Math" panose="02040503050406030204" pitchFamily="18" charset="0"/>
                       </a:rPr>
-                      <m:t>𝐶𝑖𝑝h𝑒𝑟</m:t>
-                    </m:r>
-                    <m:r>
-                      <a:rPr lang="en-US" altLang="zh-CN" i="1">
-                        <a:latin typeface="Cambria Math" panose="02040503050406030204" pitchFamily="18" charset="0"/>
-                      </a:rPr>
-                      <m:t>𝑇</m:t>
-                    </m:r>
-                    <m:r>
-                      <a:rPr lang="en-US" altLang="zh-CN" i="1">
-                        <a:latin typeface="Cambria Math" panose="02040503050406030204" pitchFamily="18" charset="0"/>
-                      </a:rPr>
-                      <m:t>𝑒𝑥𝑡</m:t>
+                      <m:t>𝐶𝑖𝑝h𝑒𝑟𝑇𝑒𝑥𝑡</m:t>
                     </m:r>
                     <m:r>
                       <a:rPr lang="en-US" altLang="zh-CN" i="1" baseline="-25000">
@@ -12534,7 +12981,7 @@
             </p:txBody>
           </p:sp>
         </mc:Choice>
-        <mc:Fallback>
+        <mc:Fallback xmlns="">
           <p:sp>
             <p:nvSpPr>
               <p:cNvPr id="60" name="文本框 59">
@@ -12591,12 +13038,12 @@
   </p:clrMapOvr>
   <mc:AlternateContent xmlns:mc="http://schemas.openxmlformats.org/markup-compatibility/2006" xmlns:p159="http://schemas.microsoft.com/office/powerpoint/2015/09/main">
     <mc:Choice Requires="p159">
-      <p:transition>
-        <p159:morph option="byObject"/>
+      <p:transition xmlns:p14="http://schemas.microsoft.com/office/powerpoint/2010/main" spd="slow" p14:dur="2000">
+        <p159:morph option="byChar"/>
       </p:transition>
     </mc:Choice>
     <mc:Fallback xmlns="">
-      <p:transition>
+      <p:transition spd="slow">
         <p:fade/>
       </p:transition>
     </mc:Fallback>
@@ -14664,7 +15111,7 @@
           <a:prstGeom prst="bentConnector4">
             <a:avLst>
               <a:gd name="adj1" fmla="val -5247"/>
-              <a:gd name="adj2" fmla="val 40339"/>
+              <a:gd name="adj2" fmla="val 42548"/>
             </a:avLst>
           </a:prstGeom>
           <a:ln w="25400">
@@ -14703,7 +15150,7 @@
         </p:nvSpPr>
         <p:spPr>
           <a:xfrm>
-            <a:off x="10886256" y="4611288"/>
+            <a:off x="11215865" y="4611288"/>
             <a:ext cx="2612046" cy="1528367"/>
           </a:xfrm>
           <a:prstGeom prst="rect">
@@ -14761,7 +15208,7 @@
         </p:nvGrpSpPr>
         <p:grpSpPr>
           <a:xfrm>
-            <a:off x="12016376" y="3897345"/>
+            <a:off x="12345985" y="3897345"/>
             <a:ext cx="385432" cy="385432"/>
             <a:chOff x="8466449" y="5881960"/>
             <a:chExt cx="385432" cy="385432"/>
@@ -14932,7 +15379,7 @@
         </p:nvGrpSpPr>
         <p:grpSpPr>
           <a:xfrm>
-            <a:off x="10837640" y="2793524"/>
+            <a:off x="11167249" y="2793524"/>
             <a:ext cx="2743438" cy="643676"/>
             <a:chOff x="996003" y="5702906"/>
             <a:chExt cx="2743438" cy="643676"/>
@@ -15031,7 +15478,7 @@
         </p:nvCxnSpPr>
         <p:spPr>
           <a:xfrm flipH="1">
-            <a:off x="12209092" y="3437200"/>
+            <a:off x="12538701" y="3437200"/>
             <a:ext cx="267" cy="460145"/>
           </a:xfrm>
           <a:prstGeom prst="straightConnector1">
@@ -15076,7 +15523,7 @@
         </p:nvCxnSpPr>
         <p:spPr>
           <a:xfrm flipH="1">
-            <a:off x="12192279" y="4282777"/>
+            <a:off x="12521888" y="4282777"/>
             <a:ext cx="16813" cy="328511"/>
           </a:xfrm>
           <a:prstGeom prst="straightConnector1">
@@ -15118,7 +15565,7 @@
         </p:nvGrpSpPr>
         <p:grpSpPr>
           <a:xfrm>
-            <a:off x="12015247" y="6837882"/>
+            <a:off x="12329172" y="6641029"/>
             <a:ext cx="385432" cy="385432"/>
             <a:chOff x="8466449" y="5881960"/>
             <a:chExt cx="385432" cy="385432"/>
@@ -15292,8 +15739,8 @@
         </p:nvCxnSpPr>
         <p:spPr>
           <a:xfrm>
-            <a:off x="12192279" y="6139655"/>
-            <a:ext cx="15684" cy="698227"/>
+            <a:off x="12521888" y="6139655"/>
+            <a:ext cx="0" cy="501374"/>
           </a:xfrm>
           <a:prstGeom prst="straightConnector1">
             <a:avLst/>
@@ -15330,14 +15777,16 @@
             </a:extLst>
           </p:cNvPr>
           <p:cNvCxnSpPr>
+            <a:cxnSpLocks/>
             <a:stCxn id="174" idx="4"/>
+            <a:endCxn id="180" idx="0"/>
           </p:cNvCxnSpPr>
           <p:nvPr/>
         </p:nvCxnSpPr>
         <p:spPr>
           <a:xfrm>
-            <a:off x="12207963" y="7223314"/>
-            <a:ext cx="5970" cy="129574"/>
+            <a:off x="12521888" y="7026461"/>
+            <a:ext cx="3344" cy="322582"/>
           </a:xfrm>
           <a:prstGeom prst="straightConnector1">
             <a:avLst/>
@@ -15378,7 +15827,7 @@
         </p:nvGrpSpPr>
         <p:grpSpPr>
           <a:xfrm>
-            <a:off x="10754864" y="7370309"/>
+            <a:off x="11010044" y="7349043"/>
             <a:ext cx="2743438" cy="643676"/>
             <a:chOff x="906234" y="758786"/>
             <a:chExt cx="2743438" cy="643676"/>
@@ -15477,11 +15926,11 @@
         <p:spPr>
           <a:xfrm flipV="1">
             <a:off x="8806500" y="4090061"/>
-            <a:ext cx="3209876" cy="2984402"/>
+            <a:ext cx="3539485" cy="3034457"/>
           </a:xfrm>
           <a:prstGeom prst="bentConnector3">
             <a:avLst>
-              <a:gd name="adj1" fmla="val 53869"/>
+              <a:gd name="adj1" fmla="val 43391"/>
             </a:avLst>
           </a:prstGeom>
           <a:ln w="25400">
@@ -15516,18 +15965,19 @@
             </a:extLst>
           </p:cNvPr>
           <p:cNvCxnSpPr>
+            <a:cxnSpLocks/>
             <a:endCxn id="174" idx="2"/>
           </p:cNvCxnSpPr>
           <p:nvPr/>
         </p:nvCxnSpPr>
         <p:spPr>
           <a:xfrm>
-            <a:off x="8806500" y="4437529"/>
-            <a:ext cx="3208747" cy="2593069"/>
+            <a:off x="8789687" y="4391175"/>
+            <a:ext cx="3539485" cy="2442570"/>
           </a:xfrm>
           <a:prstGeom prst="bentConnector3">
             <a:avLst>
-              <a:gd name="adj1" fmla="val 57388"/>
+              <a:gd name="adj1" fmla="val 59012"/>
             </a:avLst>
           </a:prstGeom>
           <a:ln w="25400">
@@ -15674,7 +16124,7 @@
         </p:nvGrpSpPr>
         <p:grpSpPr>
           <a:xfrm>
-            <a:off x="10024039" y="5243330"/>
+            <a:off x="10353648" y="5243330"/>
             <a:ext cx="861088" cy="451342"/>
             <a:chOff x="7737987" y="3001449"/>
             <a:chExt cx="888072" cy="451342"/>
@@ -15768,6 +16218,358 @@
           </p:style>
         </p:cxnSp>
       </p:grpSp>
+      <mc:AlternateContent xmlns:mc="http://schemas.openxmlformats.org/markup-compatibility/2006">
+        <mc:Choice xmlns:a14="http://schemas.microsoft.com/office/drawing/2010/main" Requires="a14">
+          <p:sp>
+            <p:nvSpPr>
+              <p:cNvPr id="96" name="文本框 95">
+                <a:extLst>
+                  <a:ext uri="{FF2B5EF4-FFF2-40B4-BE49-F238E27FC236}">
+                    <a16:creationId xmlns:a16="http://schemas.microsoft.com/office/drawing/2014/main" id="{CE6AD4FF-3252-4EE0-A806-9515F0A56CD3}"/>
+                  </a:ext>
+                </a:extLst>
+              </p:cNvPr>
+              <p:cNvSpPr txBox="1"/>
+              <p:nvPr/>
+            </p:nvSpPr>
+            <p:spPr>
+              <a:xfrm>
+                <a:off x="2542913" y="954858"/>
+                <a:ext cx="8226546" cy="553998"/>
+              </a:xfrm>
+              <a:prstGeom prst="rect">
+                <a:avLst/>
+              </a:prstGeom>
+              <a:noFill/>
+            </p:spPr>
+            <p:txBody>
+              <a:bodyPr wrap="none" lIns="0" tIns="0" rIns="0" bIns="0" rtlCol="0">
+                <a:spAutoFit/>
+              </a:bodyPr>
+              <a:lstStyle/>
+              <a:p>
+                <a:pPr/>
+                <a14:m>
+                  <m:oMathPara xmlns:m="http://schemas.openxmlformats.org/officeDocument/2006/math">
+                    <m:oMathParaPr>
+                      <m:jc m:val="centerGroup"/>
+                    </m:oMathParaPr>
+                    <m:oMath xmlns:m="http://schemas.openxmlformats.org/officeDocument/2006/math">
+                      <m:r>
+                        <a:rPr lang="en-US" altLang="zh-CN" i="1" smtClean="0">
+                          <a:latin typeface="Cambria Math" panose="02040503050406030204" pitchFamily="18" charset="0"/>
+                        </a:rPr>
+                        <m:t>𝑌</m:t>
+                      </m:r>
+                      <m:r>
+                        <a:rPr lang="en-US" altLang="zh-CN" i="1" baseline="-25000">
+                          <a:latin typeface="Cambria Math" panose="02040503050406030204" pitchFamily="18" charset="0"/>
+                        </a:rPr>
+                        <m:t>𝑖</m:t>
+                      </m:r>
+                      <m:r>
+                        <a:rPr lang="en-US" altLang="zh-CN" i="1">
+                          <a:latin typeface="Cambria Math" panose="02040503050406030204" pitchFamily="18" charset="0"/>
+                        </a:rPr>
+                        <m:t>=</m:t>
+                      </m:r>
+                      <m:r>
+                        <a:rPr lang="zh-CN" altLang="en-US" i="1" noProof="1">
+                          <a:latin typeface="Cambria Math" panose="02040503050406030204" pitchFamily="18" charset="0"/>
+                        </a:rPr>
+                        <m:t>𝑃𝑙𝑎𝑖𝑛𝑇𝑒𝑥𝑡</m:t>
+                      </m:r>
+                      <m:r>
+                        <a:rPr lang="zh-CN" altLang="en-US" i="1" baseline="-25000" noProof="1">
+                          <a:latin typeface="Cambria Math" panose="02040503050406030204" pitchFamily="18" charset="0"/>
+                        </a:rPr>
+                        <m:t>𝑖</m:t>
+                      </m:r>
+                      <m:r>
+                        <a:rPr lang="en-US" altLang="zh-CN" i="1">
+                          <a:latin typeface="Cambria Math" panose="02040503050406030204" pitchFamily="18" charset="0"/>
+                        </a:rPr>
+                        <m:t> </m:t>
+                      </m:r>
+                      <m:r>
+                        <a:rPr lang="en-US" altLang="zh-CN" i="1">
+                          <a:latin typeface="Cambria Math" panose="02040503050406030204" pitchFamily="18" charset="0"/>
+                        </a:rPr>
+                        <m:t>𝑋𝑂𝑅</m:t>
+                      </m:r>
+                      <m:r>
+                        <a:rPr lang="en-US" altLang="zh-CN" i="1">
+                          <a:latin typeface="Cambria Math" panose="02040503050406030204" pitchFamily="18" charset="0"/>
+                        </a:rPr>
+                        <m:t> </m:t>
+                      </m:r>
+                      <m:r>
+                        <a:rPr lang="en-US" altLang="zh-CN" i="1">
+                          <a:latin typeface="Cambria Math" panose="02040503050406030204" pitchFamily="18" charset="0"/>
+                        </a:rPr>
+                        <m:t>𝐶𝑖𝑝h𝑒𝑟𝑇𝑒𝑥𝑡𝑖</m:t>
+                      </m:r>
+                      <m:r>
+                        <m:rPr>
+                          <m:nor/>
+                        </m:rPr>
+                        <a:rPr lang="en-US" altLang="zh-CN" baseline="-25000">
+                          <a:latin typeface="Times New Roman" panose="02020603050405020304" pitchFamily="18" charset="0"/>
+                          <a:cs typeface="Times New Roman" panose="02020603050405020304" pitchFamily="18" charset="0"/>
+                        </a:rPr>
+                        <m:t>−</m:t>
+                      </m:r>
+                      <m:r>
+                        <a:rPr lang="en-US" altLang="zh-CN" i="1" baseline="-25000">
+                          <a:latin typeface="Cambria Math" panose="02040503050406030204" pitchFamily="18" charset="0"/>
+                        </a:rPr>
+                        <m:t>1</m:t>
+                      </m:r>
+                    </m:oMath>
+                  </m:oMathPara>
+                </a14:m>
+                <a:endParaRPr lang="en-US" altLang="zh-CN" i="1">
+                  <a:latin typeface="Cambria Math" panose="02040503050406030204" pitchFamily="18" charset="0"/>
+                </a:endParaRPr>
+              </a:p>
+              <a:p>
+                <a:pPr/>
+                <a14:m>
+                  <m:oMathPara xmlns:m="http://schemas.openxmlformats.org/officeDocument/2006/math">
+                    <m:oMathParaPr>
+                      <m:jc m:val="centerGroup"/>
+                    </m:oMathParaPr>
+                    <m:oMath xmlns:m="http://schemas.openxmlformats.org/officeDocument/2006/math">
+                      <m:r>
+                        <a:rPr lang="en-US" altLang="zh-CN" i="1">
+                          <a:latin typeface="Cambria Math" panose="02040503050406030204" pitchFamily="18" charset="0"/>
+                        </a:rPr>
+                        <m:t>𝐶𝑖𝑝h𝑒𝑟𝑇𝑒𝑥𝑡</m:t>
+                      </m:r>
+                      <m:r>
+                        <a:rPr lang="en-US" altLang="zh-CN" i="1" baseline="-25000">
+                          <a:latin typeface="Cambria Math" panose="02040503050406030204" pitchFamily="18" charset="0"/>
+                        </a:rPr>
+                        <m:t>𝑖</m:t>
+                      </m:r>
+                      <m:r>
+                        <a:rPr lang="en-US" altLang="zh-CN" i="1">
+                          <a:latin typeface="Cambria Math" panose="02040503050406030204" pitchFamily="18" charset="0"/>
+                        </a:rPr>
+                        <m:t>= </m:t>
+                      </m:r>
+                      <m:r>
+                        <a:rPr lang="en-US" altLang="zh-CN" i="1">
+                          <a:latin typeface="Cambria Math" panose="02040503050406030204" pitchFamily="18" charset="0"/>
+                        </a:rPr>
+                        <m:t>𝐹</m:t>
+                      </m:r>
+                      <m:d>
+                        <m:dPr>
+                          <m:ctrlPr>
+                            <a:rPr lang="en-US" altLang="zh-CN" i="1">
+                              <a:latin typeface="Cambria Math" panose="02040503050406030204" pitchFamily="18" charset="0"/>
+                            </a:rPr>
+                          </m:ctrlPr>
+                        </m:dPr>
+                        <m:e>
+                          <m:r>
+                            <a:rPr lang="en-US" altLang="zh-CN" i="1" err="1">
+                              <a:latin typeface="Cambria Math" panose="02040503050406030204" pitchFamily="18" charset="0"/>
+                            </a:rPr>
+                            <m:t>𝑌</m:t>
+                          </m:r>
+                          <m:r>
+                            <a:rPr lang="en-US" altLang="zh-CN" i="1" baseline="-25000">
+                              <a:latin typeface="Cambria Math" panose="02040503050406030204" pitchFamily="18" charset="0"/>
+                            </a:rPr>
+                            <m:t>𝑖</m:t>
+                          </m:r>
+                          <m:r>
+                            <a:rPr lang="en-US" altLang="zh-CN" i="1" err="1">
+                              <a:latin typeface="Cambria Math" panose="02040503050406030204" pitchFamily="18" charset="0"/>
+                            </a:rPr>
+                            <m:t>,</m:t>
+                          </m:r>
+                          <m:r>
+                            <a:rPr lang="en-US" altLang="zh-CN" i="1" err="1">
+                              <a:latin typeface="Cambria Math" panose="02040503050406030204" pitchFamily="18" charset="0"/>
+                            </a:rPr>
+                            <m:t>𝐾𝑒𝑦</m:t>
+                          </m:r>
+                        </m:e>
+                      </m:d>
+                      <m:r>
+                        <a:rPr lang="en-US" altLang="zh-CN" b="0" i="1" smtClean="0">
+                          <a:latin typeface="Cambria Math" panose="02040503050406030204" pitchFamily="18" charset="0"/>
+                        </a:rPr>
+                        <m:t> </m:t>
+                      </m:r>
+                      <m:r>
+                        <a:rPr lang="en-US" altLang="zh-CN" b="0" i="1" smtClean="0">
+                          <a:latin typeface="Cambria Math" panose="02040503050406030204" pitchFamily="18" charset="0"/>
+                        </a:rPr>
+                        <m:t>𝑋𝑂𝑅</m:t>
+                      </m:r>
+                      <m:r>
+                        <a:rPr lang="en-US" altLang="zh-CN" b="0" i="1" smtClean="0">
+                          <a:latin typeface="Cambria Math" panose="02040503050406030204" pitchFamily="18" charset="0"/>
+                        </a:rPr>
+                        <m:t> </m:t>
+                      </m:r>
+                      <m:r>
+                        <a:rPr lang="en-US" altLang="zh-CN" b="0" i="1" smtClean="0">
+                          <a:latin typeface="Cambria Math" panose="02040503050406030204" pitchFamily="18" charset="0"/>
+                        </a:rPr>
+                        <m:t>𝑃𝑙𝑎𝑖𝑛𝑇𝑒𝑥𝑡𝑖</m:t>
+                      </m:r>
+                      <m:r>
+                        <m:rPr>
+                          <m:nor/>
+                        </m:rPr>
+                        <a:rPr lang="en-US" altLang="zh-CN" baseline="-25000">
+                          <a:latin typeface="Times New Roman" panose="02020603050405020304" pitchFamily="18" charset="0"/>
+                          <a:cs typeface="Times New Roman" panose="02020603050405020304" pitchFamily="18" charset="0"/>
+                        </a:rPr>
+                        <m:t>−</m:t>
+                      </m:r>
+                      <m:r>
+                        <a:rPr lang="en-US" altLang="zh-CN" i="1" baseline="-25000">
+                          <a:latin typeface="Cambria Math" panose="02040503050406030204" pitchFamily="18" charset="0"/>
+                        </a:rPr>
+                        <m:t>1</m:t>
+                      </m:r>
+                      <m:r>
+                        <a:rPr lang="en-US" altLang="zh-CN" i="1">
+                          <a:latin typeface="Cambria Math" panose="02040503050406030204" pitchFamily="18" charset="0"/>
+                        </a:rPr>
+                        <m:t>; </m:t>
+                      </m:r>
+                      <m:r>
+                        <a:rPr lang="en-US" altLang="zh-CN" i="1">
+                          <a:latin typeface="Cambria Math" panose="02040503050406030204" pitchFamily="18" charset="0"/>
+                        </a:rPr>
+                        <m:t>𝐶𝑖𝑝h𝑒𝑟𝑇𝑒𝑥𝑡</m:t>
+                      </m:r>
+                      <m:r>
+                        <a:rPr lang="en-US" altLang="zh-CN" i="1" baseline="-25000">
+                          <a:latin typeface="Cambria Math" panose="02040503050406030204" pitchFamily="18" charset="0"/>
+                        </a:rPr>
+                        <m:t>0</m:t>
+                      </m:r>
+                      <m:r>
+                        <a:rPr lang="en-US" altLang="zh-CN" i="1">
+                          <a:latin typeface="Cambria Math" panose="02040503050406030204" pitchFamily="18" charset="0"/>
+                        </a:rPr>
+                        <m:t>=</m:t>
+                      </m:r>
+                      <m:r>
+                        <a:rPr lang="en-US" altLang="zh-CN" i="1">
+                          <a:latin typeface="Cambria Math" panose="02040503050406030204" pitchFamily="18" charset="0"/>
+                        </a:rPr>
+                        <m:t>𝐼𝑉</m:t>
+                      </m:r>
+                      <m:r>
+                        <a:rPr lang="en-US" altLang="zh-CN" b="0" i="1" baseline="-25000" smtClean="0">
+                          <a:latin typeface="Cambria Math" panose="02040503050406030204" pitchFamily="18" charset="0"/>
+                        </a:rPr>
+                        <m:t>0</m:t>
+                      </m:r>
+                      <m:r>
+                        <a:rPr lang="en-US" altLang="zh-CN" b="0" i="0" smtClean="0">
+                          <a:latin typeface="Cambria Math" panose="02040503050406030204" pitchFamily="18" charset="0"/>
+                        </a:rPr>
+                        <m:t>;</m:t>
+                      </m:r>
+                      <m:r>
+                        <m:rPr>
+                          <m:sty m:val="p"/>
+                        </m:rPr>
+                        <a:rPr lang="en-US" altLang="zh-CN" b="0" i="0" smtClean="0">
+                          <a:latin typeface="Cambria Math" panose="02040503050406030204" pitchFamily="18" charset="0"/>
+                        </a:rPr>
+                        <m:t>PlainText</m:t>
+                      </m:r>
+                      <m:r>
+                        <a:rPr lang="en-US" altLang="zh-CN" b="0" i="0" baseline="-25000" smtClean="0">
+                          <a:latin typeface="Cambria Math" panose="02040503050406030204" pitchFamily="18" charset="0"/>
+                        </a:rPr>
+                        <m:t>0</m:t>
+                      </m:r>
+                      <m:r>
+                        <a:rPr lang="en-US" altLang="zh-CN" b="0" i="0" smtClean="0">
+                          <a:latin typeface="Cambria Math" panose="02040503050406030204" pitchFamily="18" charset="0"/>
+                        </a:rPr>
+                        <m:t>=</m:t>
+                      </m:r>
+                      <m:r>
+                        <m:rPr>
+                          <m:sty m:val="p"/>
+                        </m:rPr>
+                        <a:rPr lang="en-US" altLang="zh-CN" b="0" i="0" smtClean="0">
+                          <a:latin typeface="Cambria Math" panose="02040503050406030204" pitchFamily="18" charset="0"/>
+                        </a:rPr>
+                        <m:t>IV</m:t>
+                      </m:r>
+                      <m:r>
+                        <a:rPr lang="en-US" altLang="zh-CN" b="0" i="0" baseline="-25000" smtClean="0">
+                          <a:latin typeface="Cambria Math" panose="02040503050406030204" pitchFamily="18" charset="0"/>
+                        </a:rPr>
+                        <m:t>1</m:t>
+                      </m:r>
+                    </m:oMath>
+                  </m:oMathPara>
+                </a14:m>
+                <a:endParaRPr lang="en-US" altLang="zh-CN" baseline="-25000"/>
+              </a:p>
+            </p:txBody>
+          </p:sp>
+        </mc:Choice>
+        <mc:Fallback>
+          <p:sp>
+            <p:nvSpPr>
+              <p:cNvPr id="96" name="文本框 95">
+                <a:extLst>
+                  <a:ext uri="{FF2B5EF4-FFF2-40B4-BE49-F238E27FC236}">
+                    <a16:creationId xmlns:a16="http://schemas.microsoft.com/office/drawing/2014/main" id="{CE6AD4FF-3252-4EE0-A806-9515F0A56CD3}"/>
+                  </a:ext>
+                </a:extLst>
+              </p:cNvPr>
+              <p:cNvSpPr txBox="1">
+                <a:spLocks noRot="1" noChangeAspect="1" noMove="1" noResize="1" noEditPoints="1" noAdjustHandles="1" noChangeArrowheads="1" noChangeShapeType="1" noTextEdit="1"/>
+              </p:cNvSpPr>
+              <p:nvPr/>
+            </p:nvSpPr>
+            <p:spPr>
+              <a:xfrm>
+                <a:off x="2542913" y="954858"/>
+                <a:ext cx="8226546" cy="553998"/>
+              </a:xfrm>
+              <a:prstGeom prst="rect">
+                <a:avLst/>
+              </a:prstGeom>
+              <a:blipFill>
+                <a:blip r:embed="rId4"/>
+                <a:stretch>
+                  <a:fillRect l="-296" t="-1099" b="-17582"/>
+                </a:stretch>
+              </a:blipFill>
+            </p:spPr>
+            <p:txBody>
+              <a:bodyPr/>
+              <a:lstStyle/>
+              <a:p>
+                <a:r>
+                  <a:rPr lang="zh-CN" altLang="en-US">
+                    <a:noFill/>
+                  </a:rPr>
+                  <a:t> </a:t>
+                </a:r>
+              </a:p>
+            </p:txBody>
+          </p:sp>
+        </mc:Fallback>
+      </mc:AlternateContent>
     </p:spTree>
     <p:extLst>
       <p:ext uri="{BB962C8B-B14F-4D97-AF65-F5344CB8AC3E}">
@@ -15780,12 +16582,12 @@
   </p:clrMapOvr>
   <mc:AlternateContent xmlns:mc="http://schemas.openxmlformats.org/markup-compatibility/2006" xmlns:p159="http://schemas.microsoft.com/office/powerpoint/2015/09/main">
     <mc:Choice Requires="p159">
-      <p:transition>
+      <p:transition xmlns:p14="http://schemas.microsoft.com/office/powerpoint/2010/main" spd="slow" p14:dur="2000">
         <p159:morph option="byObject"/>
       </p:transition>
     </mc:Choice>
     <mc:Fallback xmlns="">
-      <p:transition>
+      <p:transition spd="slow">
         <p:fade/>
       </p:transition>
     </mc:Fallback>
@@ -15961,7 +16763,7 @@
         </p:nvGrpSpPr>
         <p:grpSpPr>
           <a:xfrm>
-            <a:off x="902636" y="3450266"/>
+            <a:off x="942655" y="3641811"/>
             <a:ext cx="2926374" cy="643676"/>
             <a:chOff x="996003" y="3001449"/>
             <a:chExt cx="2926374" cy="643676"/>
@@ -16222,7 +17024,7 @@
         </p:nvGrpSpPr>
         <p:grpSpPr>
           <a:xfrm>
-            <a:off x="5232760" y="3765970"/>
+            <a:off x="5234136" y="3956401"/>
             <a:ext cx="385432" cy="385432"/>
             <a:chOff x="8466449" y="5881960"/>
             <a:chExt cx="385432" cy="385432"/>
@@ -16587,7 +17389,7 @@
         <p:spPr>
           <a:xfrm>
             <a:off x="5422033" y="3540578"/>
-            <a:ext cx="3443" cy="225392"/>
+            <a:ext cx="4819" cy="415823"/>
           </a:xfrm>
           <a:prstGeom prst="straightConnector1">
             <a:avLst/>
@@ -16631,8 +17433,8 @@
         </p:nvCxnSpPr>
         <p:spPr>
           <a:xfrm>
-            <a:off x="3646074" y="3956770"/>
-            <a:ext cx="1586686" cy="1916"/>
+            <a:off x="3686093" y="4148315"/>
+            <a:ext cx="1548043" cy="802"/>
           </a:xfrm>
           <a:prstGeom prst="straightConnector1">
             <a:avLst/>
@@ -16676,8 +17478,8 @@
         </p:nvCxnSpPr>
         <p:spPr>
           <a:xfrm>
-            <a:off x="5425476" y="4151402"/>
-            <a:ext cx="8819" cy="515035"/>
+            <a:off x="5426852" y="4341833"/>
+            <a:ext cx="7443" cy="324604"/>
           </a:xfrm>
           <a:prstGeom prst="straightConnector1">
             <a:avLst/>
@@ -17083,7 +17885,7 @@
         </p:nvGrpSpPr>
         <p:grpSpPr>
           <a:xfrm>
-            <a:off x="8900802" y="3776862"/>
+            <a:off x="8894590" y="3925934"/>
             <a:ext cx="385432" cy="385432"/>
             <a:chOff x="8466449" y="5881960"/>
             <a:chExt cx="385432" cy="385432"/>
@@ -17446,9 +18248,9 @@
           <p:nvPr/>
         </p:nvCxnSpPr>
         <p:spPr>
-          <a:xfrm>
-            <a:off x="9093518" y="3540578"/>
-            <a:ext cx="0" cy="236284"/>
+          <a:xfrm flipH="1">
+            <a:off x="9087306" y="3540578"/>
+            <a:ext cx="6212" cy="385356"/>
           </a:xfrm>
           <a:prstGeom prst="straightConnector1">
             <a:avLst/>
@@ -17492,8 +18294,8 @@
         </p:nvCxnSpPr>
         <p:spPr>
           <a:xfrm>
-            <a:off x="9093518" y="4162294"/>
-            <a:ext cx="3847" cy="503176"/>
+            <a:off x="9087306" y="4311366"/>
+            <a:ext cx="10059" cy="354104"/>
           </a:xfrm>
           <a:prstGeom prst="straightConnector1">
             <a:avLst/>
@@ -17792,20 +18594,19 @@
             </a:extLst>
           </p:cNvPr>
           <p:cNvCxnSpPr>
-            <a:stCxn id="130" idx="4"/>
+            <a:cxnSpLocks/>
             <a:endCxn id="157" idx="2"/>
           </p:cNvCxnSpPr>
           <p:nvPr/>
         </p:nvCxnSpPr>
         <p:spPr>
-          <a:xfrm rot="5400000" flipH="1" flipV="1">
-            <a:off x="5568395" y="3837831"/>
-            <a:ext cx="3200660" cy="3464154"/>
-          </a:xfrm>
-          <a:prstGeom prst="bentConnector4">
+          <a:xfrm flipV="1">
+            <a:off x="5419401" y="4118650"/>
+            <a:ext cx="3475189" cy="2362192"/>
+          </a:xfrm>
+          <a:prstGeom prst="bentConnector3">
             <a:avLst>
-              <a:gd name="adj1" fmla="val -2491"/>
-              <a:gd name="adj2" fmla="val 59300"/>
+              <a:gd name="adj1" fmla="val 60708"/>
             </a:avLst>
           </a:prstGeom>
           <a:ln w="25400">
@@ -17847,12 +18648,12 @@
         </p:nvCxnSpPr>
         <p:spPr>
           <a:xfrm>
-            <a:off x="5424984" y="4400274"/>
-            <a:ext cx="3490433" cy="2577248"/>
+            <a:off x="5430573" y="3732912"/>
+            <a:ext cx="3484844" cy="3244610"/>
           </a:xfrm>
           <a:prstGeom prst="bentConnector3">
             <a:avLst>
-              <a:gd name="adj1" fmla="val 45472"/>
+              <a:gd name="adj1" fmla="val 44508"/>
             </a:avLst>
           </a:prstGeom>
           <a:ln w="25400">
@@ -18057,7 +18858,7 @@
         </p:nvGrpSpPr>
         <p:grpSpPr>
           <a:xfrm>
-            <a:off x="12546667" y="3753067"/>
+            <a:off x="12547960" y="3892214"/>
             <a:ext cx="385432" cy="385432"/>
             <a:chOff x="8466449" y="5881960"/>
             <a:chExt cx="385432" cy="385432"/>
@@ -18422,7 +19223,7 @@
         <p:spPr>
           <a:xfrm>
             <a:off x="12735940" y="3516384"/>
-            <a:ext cx="3443" cy="236683"/>
+            <a:ext cx="4736" cy="375830"/>
           </a:xfrm>
           <a:prstGeom prst="straightConnector1">
             <a:avLst/>
@@ -18466,8 +19267,8 @@
         </p:nvCxnSpPr>
         <p:spPr>
           <a:xfrm>
-            <a:off x="12739383" y="4138499"/>
-            <a:ext cx="1293" cy="650501"/>
+            <a:off x="12740676" y="4277646"/>
+            <a:ext cx="0" cy="511354"/>
           </a:xfrm>
           <a:prstGeom prst="straightConnector1">
             <a:avLst/>
@@ -18881,12 +19682,12 @@
         </p:nvCxnSpPr>
         <p:spPr>
           <a:xfrm>
-            <a:off x="9112836" y="4381725"/>
-            <a:ext cx="3445003" cy="2571603"/>
+            <a:off x="9090412" y="3693382"/>
+            <a:ext cx="3467427" cy="3259946"/>
           </a:xfrm>
           <a:prstGeom prst="bentConnector3">
             <a:avLst>
-              <a:gd name="adj1" fmla="val 41808"/>
+              <a:gd name="adj1" fmla="val 41391"/>
             </a:avLst>
           </a:prstGeom>
           <a:ln w="25400">
@@ -18921,20 +19722,19 @@
             </a:extLst>
           </p:cNvPr>
           <p:cNvCxnSpPr>
-            <a:stCxn id="192" idx="4"/>
+            <a:cxnSpLocks/>
             <a:endCxn id="202" idx="2"/>
           </p:cNvCxnSpPr>
           <p:nvPr/>
         </p:nvCxnSpPr>
         <p:spPr>
-          <a:xfrm rot="5400000" flipH="1" flipV="1">
-            <a:off x="9215172" y="3838744"/>
-            <a:ext cx="3224455" cy="3438534"/>
-          </a:xfrm>
-          <a:prstGeom prst="bentConnector4">
+          <a:xfrm flipV="1">
+            <a:off x="9097364" y="4084930"/>
+            <a:ext cx="3450596" cy="2404391"/>
+          </a:xfrm>
+          <a:prstGeom prst="bentConnector3">
             <a:avLst>
-              <a:gd name="adj1" fmla="val -2474"/>
-              <a:gd name="adj2" fmla="val 56413"/>
+              <a:gd name="adj1" fmla="val 56038"/>
             </a:avLst>
           </a:prstGeom>
           <a:ln w="25400">
@@ -18959,6 +19759,323 @@
           </a:fontRef>
         </p:style>
       </p:cxnSp>
+      <mc:AlternateContent xmlns:mc="http://schemas.openxmlformats.org/markup-compatibility/2006">
+        <mc:Choice xmlns:a14="http://schemas.microsoft.com/office/drawing/2010/main" Requires="a14">
+          <p:sp>
+            <p:nvSpPr>
+              <p:cNvPr id="103" name="文本框 102">
+                <a:extLst>
+                  <a:ext uri="{FF2B5EF4-FFF2-40B4-BE49-F238E27FC236}">
+                    <a16:creationId xmlns:a16="http://schemas.microsoft.com/office/drawing/2014/main" id="{C1C6F3DC-1CEB-4F03-832C-E4C33695E928}"/>
+                  </a:ext>
+                </a:extLst>
+              </p:cNvPr>
+              <p:cNvSpPr txBox="1"/>
+              <p:nvPr/>
+            </p:nvSpPr>
+            <p:spPr>
+              <a:xfrm>
+                <a:off x="2542913" y="954858"/>
+                <a:ext cx="7294113" cy="547650"/>
+              </a:xfrm>
+              <a:prstGeom prst="rect">
+                <a:avLst/>
+              </a:prstGeom>
+              <a:noFill/>
+            </p:spPr>
+            <p:txBody>
+              <a:bodyPr wrap="none" lIns="0" tIns="0" rIns="0" bIns="0" rtlCol="0">
+                <a:spAutoFit/>
+              </a:bodyPr>
+              <a:lstStyle/>
+              <a:p>
+                <a:pPr/>
+                <a14:m>
+                  <m:oMathPara xmlns:m="http://schemas.openxmlformats.org/officeDocument/2006/math">
+                    <m:oMathParaPr>
+                      <m:jc m:val="centerGroup"/>
+                    </m:oMathParaPr>
+                    <m:oMath xmlns:m="http://schemas.openxmlformats.org/officeDocument/2006/math">
+                      <m:r>
+                        <a:rPr lang="en-US" altLang="zh-CN" i="1" smtClean="0">
+                          <a:latin typeface="Cambria Math" panose="02040503050406030204" pitchFamily="18" charset="0"/>
+                        </a:rPr>
+                        <m:t>𝑌</m:t>
+                      </m:r>
+                      <m:r>
+                        <a:rPr lang="en-US" altLang="zh-CN" i="1" baseline="-25000">
+                          <a:latin typeface="Cambria Math" panose="02040503050406030204" pitchFamily="18" charset="0"/>
+                        </a:rPr>
+                        <m:t>𝑖</m:t>
+                      </m:r>
+                      <m:r>
+                        <a:rPr lang="en-US" altLang="zh-CN" i="1">
+                          <a:latin typeface="Cambria Math" panose="02040503050406030204" pitchFamily="18" charset="0"/>
+                        </a:rPr>
+                        <m:t>=</m:t>
+                      </m:r>
+                      <m:r>
+                        <a:rPr lang="en-US" altLang="zh-CN" b="0" i="1" smtClean="0">
+                          <a:latin typeface="Cambria Math" panose="02040503050406030204" pitchFamily="18" charset="0"/>
+                        </a:rPr>
+                        <m:t>𝐶𝑖𝑝h𝑒𝑟𝑇𝑒𝑥𝑡</m:t>
+                      </m:r>
+                      <m:r>
+                        <a:rPr lang="en-US" altLang="zh-CN" b="0" i="1" baseline="-25000" smtClean="0">
+                          <a:latin typeface="Cambria Math" panose="02040503050406030204" pitchFamily="18" charset="0"/>
+                        </a:rPr>
+                        <m:t>𝑖</m:t>
+                      </m:r>
+                      <m:r>
+                        <a:rPr lang="en-US" altLang="zh-CN" b="0" i="1" smtClean="0">
+                          <a:latin typeface="Cambria Math" panose="02040503050406030204" pitchFamily="18" charset="0"/>
+                        </a:rPr>
+                        <m:t> </m:t>
+                      </m:r>
+                      <m:r>
+                        <a:rPr lang="en-US" altLang="zh-CN" b="0" i="1" smtClean="0">
+                          <a:latin typeface="Cambria Math" panose="02040503050406030204" pitchFamily="18" charset="0"/>
+                        </a:rPr>
+                        <m:t>𝑋𝑂𝑅</m:t>
+                      </m:r>
+                      <m:r>
+                        <a:rPr lang="en-US" altLang="zh-CN" b="0" i="1" smtClean="0">
+                          <a:latin typeface="Cambria Math" panose="02040503050406030204" pitchFamily="18" charset="0"/>
+                        </a:rPr>
+                        <m:t> </m:t>
+                      </m:r>
+                      <m:r>
+                        <a:rPr lang="en-US" altLang="zh-CN" b="0" i="1" smtClean="0">
+                          <a:latin typeface="Cambria Math" panose="02040503050406030204" pitchFamily="18" charset="0"/>
+                        </a:rPr>
+                        <m:t>𝑃𝑙𝑎𝑖𝑛𝑇𝑒𝑥𝑡𝑖</m:t>
+                      </m:r>
+                      <m:r>
+                        <m:rPr>
+                          <m:nor/>
+                        </m:rPr>
+                        <a:rPr lang="en-US" altLang="zh-CN" baseline="-25000">
+                          <a:latin typeface="Times New Roman" panose="02020603050405020304" pitchFamily="18" charset="0"/>
+                          <a:cs typeface="Times New Roman" panose="02020603050405020304" pitchFamily="18" charset="0"/>
+                        </a:rPr>
+                        <m:t>−</m:t>
+                      </m:r>
+                      <m:r>
+                        <a:rPr lang="en-US" altLang="zh-CN" i="1" baseline="-25000">
+                          <a:latin typeface="Cambria Math" panose="02040503050406030204" pitchFamily="18" charset="0"/>
+                        </a:rPr>
+                        <m:t>1</m:t>
+                      </m:r>
+                    </m:oMath>
+                  </m:oMathPara>
+                </a14:m>
+                <a:endParaRPr lang="en-US" altLang="zh-CN" i="1" baseline="-25000">
+                  <a:latin typeface="Cambria Math" panose="02040503050406030204" pitchFamily="18" charset="0"/>
+                </a:endParaRPr>
+              </a:p>
+              <a:p>
+                <a14:m>
+                  <m:oMath xmlns:m="http://schemas.openxmlformats.org/officeDocument/2006/math">
+                    <m:r>
+                      <a:rPr lang="en-US" altLang="zh-CN" i="1">
+                        <a:latin typeface="Cambria Math" panose="02040503050406030204" pitchFamily="18" charset="0"/>
+                      </a:rPr>
+                      <m:t>𝑃𝑙𝑎𝑖𝑛𝑇𝑒𝑥𝑡</m:t>
+                    </m:r>
+                    <m:r>
+                      <a:rPr lang="en-US" altLang="zh-CN" i="1">
+                        <a:latin typeface="Cambria Math" panose="02040503050406030204" pitchFamily="18" charset="0"/>
+                      </a:rPr>
+                      <m:t>=</m:t>
+                    </m:r>
+                    <m:r>
+                      <a:rPr lang="en-US" altLang="zh-CN" i="1">
+                        <a:latin typeface="Cambria Math" panose="02040503050406030204" pitchFamily="18" charset="0"/>
+                      </a:rPr>
+                      <m:t>𝑌𝑖</m:t>
+                    </m:r>
+                    <m:r>
+                      <a:rPr lang="en-US" altLang="zh-CN" i="1" baseline="-25000">
+                        <a:latin typeface="Cambria Math" panose="02040503050406030204" pitchFamily="18" charset="0"/>
+                      </a:rPr>
+                      <m:t>  </m:t>
+                    </m:r>
+                    <m:r>
+                      <a:rPr lang="en-US" altLang="zh-CN" i="1">
+                        <a:latin typeface="Cambria Math" panose="02040503050406030204" pitchFamily="18" charset="0"/>
+                      </a:rPr>
+                      <m:t>𝑋𝑂𝑅</m:t>
+                    </m:r>
+                    <m:r>
+                      <a:rPr lang="en-US" altLang="zh-CN" i="1">
+                        <a:latin typeface="Cambria Math" panose="02040503050406030204" pitchFamily="18" charset="0"/>
+                      </a:rPr>
+                      <m:t> </m:t>
+                    </m:r>
+                    <m:r>
+                      <a:rPr lang="en-US" altLang="zh-CN" i="1">
+                        <a:latin typeface="Cambria Math" panose="02040503050406030204" pitchFamily="18" charset="0"/>
+                      </a:rPr>
+                      <m:t>𝐶h𝑖𝑝𝑒𝑟𝑇𝑒𝑥𝑡𝑖</m:t>
+                    </m:r>
+                    <m:r>
+                      <m:rPr>
+                        <m:nor/>
+                      </m:rPr>
+                      <a:rPr lang="en-US" altLang="zh-CN" baseline="-25000">
+                        <a:latin typeface="Times New Roman" panose="02020603050405020304" pitchFamily="18" charset="0"/>
+                        <a:cs typeface="Times New Roman" panose="02020603050405020304" pitchFamily="18" charset="0"/>
+                      </a:rPr>
+                      <m:t>−</m:t>
+                    </m:r>
+                    <m:r>
+                      <a:rPr lang="en-US" altLang="zh-CN" i="1" baseline="-25000">
+                        <a:latin typeface="Cambria Math" panose="02040503050406030204" pitchFamily="18" charset="0"/>
+                      </a:rPr>
+                      <m:t>1</m:t>
+                    </m:r>
+                  </m:oMath>
+                </a14:m>
+                <a:r>
+                  <a:rPr lang="en-US" altLang="zh-CN" i="1">
+                    <a:latin typeface="Cambria Math" panose="02040503050406030204" pitchFamily="18" charset="0"/>
+                  </a:rPr>
+                  <a:t>;</a:t>
+                </a:r>
+                <a14:m>
+                  <m:oMath xmlns:m="http://schemas.openxmlformats.org/officeDocument/2006/math">
+                    <m:r>
+                      <a:rPr lang="en-US" altLang="zh-CN" i="1">
+                        <a:latin typeface="Cambria Math" panose="02040503050406030204" pitchFamily="18" charset="0"/>
+                      </a:rPr>
+                      <m:t>; </m:t>
+                    </m:r>
+                    <m:r>
+                      <a:rPr lang="en-US" altLang="zh-CN" i="1">
+                        <a:latin typeface="Cambria Math" panose="02040503050406030204" pitchFamily="18" charset="0"/>
+                      </a:rPr>
+                      <m:t>𝐶𝑖𝑝h𝑒𝑟𝑇𝑒𝑥𝑡</m:t>
+                    </m:r>
+                    <m:r>
+                      <a:rPr lang="en-US" altLang="zh-CN" i="1" baseline="-25000">
+                        <a:latin typeface="Cambria Math" panose="02040503050406030204" pitchFamily="18" charset="0"/>
+                      </a:rPr>
+                      <m:t>0</m:t>
+                    </m:r>
+                    <m:r>
+                      <a:rPr lang="en-US" altLang="zh-CN" i="1">
+                        <a:latin typeface="Cambria Math" panose="02040503050406030204" pitchFamily="18" charset="0"/>
+                      </a:rPr>
+                      <m:t>=</m:t>
+                    </m:r>
+                    <m:r>
+                      <a:rPr lang="en-US" altLang="zh-CN" i="1">
+                        <a:latin typeface="Cambria Math" panose="02040503050406030204" pitchFamily="18" charset="0"/>
+                      </a:rPr>
+                      <m:t>𝐼𝑉</m:t>
+                    </m:r>
+                    <m:r>
+                      <a:rPr lang="en-US" altLang="zh-CN" i="1" baseline="-25000">
+                        <a:latin typeface="Cambria Math" panose="02040503050406030204" pitchFamily="18" charset="0"/>
+                      </a:rPr>
+                      <m:t>0</m:t>
+                    </m:r>
+                    <m:r>
+                      <a:rPr lang="en-US" altLang="zh-CN">
+                        <a:latin typeface="Cambria Math" panose="02040503050406030204" pitchFamily="18" charset="0"/>
+                      </a:rPr>
+                      <m:t>;</m:t>
+                    </m:r>
+                    <m:r>
+                      <m:rPr>
+                        <m:sty m:val="p"/>
+                      </m:rPr>
+                      <a:rPr lang="en-US" altLang="zh-CN">
+                        <a:latin typeface="Cambria Math" panose="02040503050406030204" pitchFamily="18" charset="0"/>
+                      </a:rPr>
+                      <m:t>PlainText</m:t>
+                    </m:r>
+                    <m:r>
+                      <a:rPr lang="en-US" altLang="zh-CN" baseline="-25000">
+                        <a:latin typeface="Cambria Math" panose="02040503050406030204" pitchFamily="18" charset="0"/>
+                      </a:rPr>
+                      <m:t>0</m:t>
+                    </m:r>
+                    <m:r>
+                      <a:rPr lang="en-US" altLang="zh-CN">
+                        <a:latin typeface="Cambria Math" panose="02040503050406030204" pitchFamily="18" charset="0"/>
+                      </a:rPr>
+                      <m:t>=</m:t>
+                    </m:r>
+                    <m:r>
+                      <m:rPr>
+                        <m:sty m:val="p"/>
+                      </m:rPr>
+                      <a:rPr lang="en-US" altLang="zh-CN">
+                        <a:latin typeface="Cambria Math" panose="02040503050406030204" pitchFamily="18" charset="0"/>
+                      </a:rPr>
+                      <m:t>IV</m:t>
+                    </m:r>
+                    <m:r>
+                      <a:rPr lang="en-US" altLang="zh-CN" baseline="-25000">
+                        <a:latin typeface="Cambria Math" panose="02040503050406030204" pitchFamily="18" charset="0"/>
+                      </a:rPr>
+                      <m:t>1</m:t>
+                    </m:r>
+                  </m:oMath>
+                </a14:m>
+                <a:endParaRPr lang="en-US" altLang="zh-CN" i="1">
+                  <a:latin typeface="Cambria Math" panose="02040503050406030204" pitchFamily="18" charset="0"/>
+                </a:endParaRPr>
+              </a:p>
+            </p:txBody>
+          </p:sp>
+        </mc:Choice>
+        <mc:Fallback>
+          <p:sp>
+            <p:nvSpPr>
+              <p:cNvPr id="103" name="文本框 102">
+                <a:extLst>
+                  <a:ext uri="{FF2B5EF4-FFF2-40B4-BE49-F238E27FC236}">
+                    <a16:creationId xmlns:a16="http://schemas.microsoft.com/office/drawing/2014/main" id="{C1C6F3DC-1CEB-4F03-832C-E4C33695E928}"/>
+                  </a:ext>
+                </a:extLst>
+              </p:cNvPr>
+              <p:cNvSpPr txBox="1">
+                <a:spLocks noRot="1" noChangeAspect="1" noMove="1" noResize="1" noEditPoints="1" noAdjustHandles="1" noChangeArrowheads="1" noChangeShapeType="1" noTextEdit="1"/>
+              </p:cNvSpPr>
+              <p:nvPr/>
+            </p:nvSpPr>
+            <p:spPr>
+              <a:xfrm>
+                <a:off x="2542913" y="954858"/>
+                <a:ext cx="7294113" cy="547650"/>
+              </a:xfrm>
+              <a:prstGeom prst="rect">
+                <a:avLst/>
+              </a:prstGeom>
+              <a:blipFill>
+                <a:blip r:embed="rId5"/>
+                <a:stretch>
+                  <a:fillRect l="-1170" t="-1124" b="-24719"/>
+                </a:stretch>
+              </a:blipFill>
+            </p:spPr>
+            <p:txBody>
+              <a:bodyPr/>
+              <a:lstStyle/>
+              <a:p>
+                <a:r>
+                  <a:rPr lang="zh-CN" altLang="en-US">
+                    <a:noFill/>
+                  </a:rPr>
+                  <a:t> </a:t>
+                </a:r>
+              </a:p>
+            </p:txBody>
+          </p:sp>
+        </mc:Fallback>
+      </mc:AlternateContent>
     </p:spTree>
     <p:extLst>
       <p:ext uri="{BB962C8B-B14F-4D97-AF65-F5344CB8AC3E}">
@@ -18971,12 +20088,12 @@
   </p:clrMapOvr>
   <mc:AlternateContent xmlns:mc="http://schemas.openxmlformats.org/markup-compatibility/2006" xmlns:p159="http://schemas.microsoft.com/office/powerpoint/2015/09/main">
     <mc:Choice Requires="p159">
-      <p:transition>
-        <p159:morph option="byObject"/>
+      <p:transition xmlns:p14="http://schemas.microsoft.com/office/powerpoint/2010/main" spd="slow" p14:dur="2000">
+        <p159:morph option="byChar"/>
       </p:transition>
     </mc:Choice>
     <mc:Fallback xmlns="">
-      <p:transition>
+      <p:transition spd="slow">
         <p:fade/>
       </p:transition>
     </mc:Fallback>

</xml_diff>